<commit_message>
Enable code block formatting with listings in BeamerFormatter
</commit_message>
<xml_diff>
--- a/tests/everything.pptx
+++ b/tests/everything.pptx
@@ -3560,7 +3560,7 @@
             </p:spPr>
             <p:txBody>
               <a:bodyPr>
-                <a:normAutofit fontScale="62500" lnSpcReduction="20000"/>
+                <a:normAutofit fontScale="47500" lnSpcReduction="20000"/>
               </a:bodyPr>
               <a:lstStyle/>
               <a:p>
@@ -3616,6 +3616,97 @@
               <a:p>
                 <a14:m>
                   <m:oMath xmlns:m="http://schemas.openxmlformats.org/officeDocument/2006/math">
+                    <m:r>
+                      <a:rPr lang="es-ES" i="1" smtClean="0">
+                        <a:latin typeface="Cambria Math" panose="02040503050406030204" pitchFamily="18" charset="0"/>
+                        <a:ea typeface="Cambria Math" panose="02040503050406030204" pitchFamily="18" charset="0"/>
+                      </a:rPr>
+                      <m:t>∀</m:t>
+                    </m:r>
+                    <m:r>
+                      <a:rPr lang="es-ES" i="1" smtClean="0">
+                        <a:latin typeface="Cambria Math" panose="02040503050406030204" pitchFamily="18" charset="0"/>
+                        <a:ea typeface="Cambria Math" panose="02040503050406030204" pitchFamily="18" charset="0"/>
+                      </a:rPr>
+                      <m:t>ℂ</m:t>
+                    </m:r>
+                    <m:r>
+                      <a:rPr lang="es-ES" i="1" smtClean="0">
+                        <a:latin typeface="Cambria Math" panose="02040503050406030204" pitchFamily="18" charset="0"/>
+                        <a:ea typeface="Cambria Math" panose="02040503050406030204" pitchFamily="18" charset="0"/>
+                      </a:rPr>
+                      <m:t>Ⅎ</m:t>
+                    </m:r>
+                    <m:r>
+                      <a:rPr lang="es-ES" i="1" smtClean="0">
+                        <a:latin typeface="Cambria Math" panose="02040503050406030204" pitchFamily="18" charset="0"/>
+                        <a:ea typeface="Cambria Math" panose="02040503050406030204" pitchFamily="18" charset="0"/>
+                      </a:rPr>
+                      <m:t>ℌ</m:t>
+                    </m:r>
+                    <m:r>
+                      <a:rPr lang="es-ES" i="1" smtClean="0">
+                        <a:latin typeface="Cambria Math" panose="02040503050406030204" pitchFamily="18" charset="0"/>
+                        <a:ea typeface="Cambria Math" panose="02040503050406030204" pitchFamily="18" charset="0"/>
+                      </a:rPr>
+                      <m:t>ℱℴ</m:t>
+                    </m:r>
+                    <m:r>
+                      <a:rPr lang="es-ES" i="1" smtClean="0">
+                        <a:latin typeface="Cambria Math" panose="02040503050406030204" pitchFamily="18" charset="0"/>
+                        <a:ea typeface="Cambria Math" panose="02040503050406030204" pitchFamily="18" charset="0"/>
+                      </a:rPr>
+                      <m:t>∃∄Å℧</m:t>
+                    </m:r>
+                    <m:r>
+                      <a:rPr lang="es-ES" i="1" smtClean="0">
+                        <a:latin typeface="Cambria Math" panose="02040503050406030204" pitchFamily="18" charset="0"/>
+                        <a:ea typeface="Cambria Math" panose="02040503050406030204" pitchFamily="18" charset="0"/>
+                      </a:rPr>
+                      <m:t>ℝ</m:t>
+                    </m:r>
+                    <m:r>
+                      <a:rPr lang="es-ES" i="1" smtClean="0">
+                        <a:latin typeface="Cambria Math" panose="02040503050406030204" pitchFamily="18" charset="0"/>
+                        <a:ea typeface="Cambria Math" panose="02040503050406030204" pitchFamily="18" charset="0"/>
+                      </a:rPr>
+                      <m:t>ℜ</m:t>
+                    </m:r>
+                    <m:r>
+                      <a:rPr lang="es-ES" i="1" smtClean="0">
+                        <a:latin typeface="Cambria Math" panose="02040503050406030204" pitchFamily="18" charset="0"/>
+                        <a:ea typeface="Cambria Math" panose="02040503050406030204" pitchFamily="18" charset="0"/>
+                      </a:rPr>
+                      <m:t>ℚ</m:t>
+                    </m:r>
+                    <m:r>
+                      <a:rPr lang="es-ES" i="1" smtClean="0">
+                        <a:latin typeface="Cambria Math" panose="02040503050406030204" pitchFamily="18" charset="0"/>
+                        <a:ea typeface="Cambria Math" panose="02040503050406030204" pitchFamily="18" charset="0"/>
+                      </a:rPr>
+                      <m:t>℘</m:t>
+                    </m:r>
+                    <m:r>
+                      <a:rPr lang="es-ES" i="1" smtClean="0">
+                        <a:latin typeface="Cambria Math" panose="02040503050406030204" pitchFamily="18" charset="0"/>
+                        <a:ea typeface="Cambria Math" panose="02040503050406030204" pitchFamily="18" charset="0"/>
+                      </a:rPr>
+                      <m:t>ℕ</m:t>
+                    </m:r>
+                    <m:r>
+                      <a:rPr lang="es-ES" i="1" smtClean="0">
+                        <a:latin typeface="Cambria Math" panose="02040503050406030204" pitchFamily="18" charset="0"/>
+                        <a:ea typeface="Cambria Math" panose="02040503050406030204" pitchFamily="18" charset="0"/>
+                      </a:rPr>
+                      <m:t>𝜘</m:t>
+                    </m:r>
+                    <m:r>
+                      <a:rPr lang="es-ES" i="1" smtClean="0">
+                        <a:latin typeface="Cambria Math" panose="02040503050406030204" pitchFamily="18" charset="0"/>
+                        <a:ea typeface="Cambria Math" panose="02040503050406030204" pitchFamily="18" charset="0"/>
+                      </a:rPr>
+                      <m:t>≅∘∕∓</m:t>
+                    </m:r>
                     <m:d>
                       <m:dPr>
                         <m:ctrlPr>
@@ -4327,7 +4418,7 @@
               <a:blipFill>
                 <a:blip r:embed="rId2"/>
                 <a:stretch>
-                  <a:fillRect l="-406" t="-4732"/>
+                  <a:fillRect l="-58" t="-3470" b="-47003"/>
                 </a:stretch>
               </a:blipFill>
             </p:spPr>

</xml_diff>